<commit_message>
Created PDF for Showcase
</commit_message>
<xml_diff>
--- a/PPT/CS6675-PiTrust.pptx
+++ b/PPT/CS6675-PiTrust.pptx
@@ -161,12 +161,12 @@
   <pc:docChgLst>
     <pc:chgData name="Wissmann, Pascal" userId="3016caea-640a-463c-abe9-ea80566b342c" providerId="ADAL" clId="{6B201AE3-64E9-454E-8B40-F363867985BE}"/>
     <pc:docChg chg="undo custSel addSld delSld modSld">
-      <pc:chgData name="Wissmann, Pascal" userId="3016caea-640a-463c-abe9-ea80566b342c" providerId="ADAL" clId="{6B201AE3-64E9-454E-8B40-F363867985BE}" dt="2022-05-05T09:36:06.724" v="8911" actId="20577"/>
+      <pc:chgData name="Wissmann, Pascal" userId="3016caea-640a-463c-abe9-ea80566b342c" providerId="ADAL" clId="{6B201AE3-64E9-454E-8B40-F363867985BE}" dt="2022-05-05T12:25:12.409" v="8913" actId="20577"/>
       <pc:docMkLst>
         <pc:docMk/>
       </pc:docMkLst>
       <pc:sldChg chg="modSp mod">
-        <pc:chgData name="Wissmann, Pascal" userId="3016caea-640a-463c-abe9-ea80566b342c" providerId="ADAL" clId="{6B201AE3-64E9-454E-8B40-F363867985BE}" dt="2022-05-02T18:43:27.127" v="137" actId="20577"/>
+        <pc:chgData name="Wissmann, Pascal" userId="3016caea-640a-463c-abe9-ea80566b342c" providerId="ADAL" clId="{6B201AE3-64E9-454E-8B40-F363867985BE}" dt="2022-05-05T12:25:12.409" v="8913" actId="20577"/>
         <pc:sldMkLst>
           <pc:docMk/>
           <pc:sldMk cId="2789775945" sldId="256"/>
@@ -180,7 +180,7 @@
           </ac:spMkLst>
         </pc:spChg>
         <pc:spChg chg="mod">
-          <ac:chgData name="Wissmann, Pascal" userId="3016caea-640a-463c-abe9-ea80566b342c" providerId="ADAL" clId="{6B201AE3-64E9-454E-8B40-F363867985BE}" dt="2022-05-02T18:43:27.127" v="137" actId="20577"/>
+          <ac:chgData name="Wissmann, Pascal" userId="3016caea-640a-463c-abe9-ea80566b342c" providerId="ADAL" clId="{6B201AE3-64E9-454E-8B40-F363867985BE}" dt="2022-05-05T12:25:12.409" v="8913" actId="20577"/>
           <ac:spMkLst>
             <pc:docMk/>
             <pc:sldMk cId="2789775945" sldId="256"/>
@@ -4482,7 +4482,7 @@
             </a:pPr>
             <a:r>
               <a:rPr lang="en-US" dirty="0"/>
-              <a:t>03 May 2022</a:t>
+              <a:t>05 May 2022</a:t>
             </a:r>
             <a:endParaRPr lang="en-US" sz="1800" dirty="0">
               <a:solidFill>

</xml_diff>